<commit_message>
made sure all test cases are passed
</commit_message>
<xml_diff>
--- a/src/test/resources/org/sikuli/slides/api/badSecondStep.pptx
+++ b/src/test/resources/org/sikuli/slides/api/badSecondStep.pptx
@@ -289,7 +289,7 @@
           <a:p>
             <a:fld id="{A0FB1AA8-4F81-414A-9DAE-F97FE8EB8E18}" type="datetimeFigureOut">
               <a:rPr lang="en-US" smtClean="0"/>
-              <a:t>8/4/13</a:t>
+              <a:t>8/13/13</a:t>
             </a:fld>
             <a:endParaRPr lang="en-US"/>
           </a:p>
@@ -459,7 +459,7 @@
           <a:p>
             <a:fld id="{A0FB1AA8-4F81-414A-9DAE-F97FE8EB8E18}" type="datetimeFigureOut">
               <a:rPr lang="en-US" smtClean="0"/>
-              <a:t>8/4/13</a:t>
+              <a:t>8/13/13</a:t>
             </a:fld>
             <a:endParaRPr lang="en-US"/>
           </a:p>
@@ -639,7 +639,7 @@
           <a:p>
             <a:fld id="{A0FB1AA8-4F81-414A-9DAE-F97FE8EB8E18}" type="datetimeFigureOut">
               <a:rPr lang="en-US" smtClean="0"/>
-              <a:t>8/4/13</a:t>
+              <a:t>8/13/13</a:t>
             </a:fld>
             <a:endParaRPr lang="en-US"/>
           </a:p>
@@ -809,7 +809,7 @@
           <a:p>
             <a:fld id="{A0FB1AA8-4F81-414A-9DAE-F97FE8EB8E18}" type="datetimeFigureOut">
               <a:rPr lang="en-US" smtClean="0"/>
-              <a:t>8/4/13</a:t>
+              <a:t>8/13/13</a:t>
             </a:fld>
             <a:endParaRPr lang="en-US"/>
           </a:p>
@@ -1055,7 +1055,7 @@
           <a:p>
             <a:fld id="{A0FB1AA8-4F81-414A-9DAE-F97FE8EB8E18}" type="datetimeFigureOut">
               <a:rPr lang="en-US" smtClean="0"/>
-              <a:t>8/4/13</a:t>
+              <a:t>8/13/13</a:t>
             </a:fld>
             <a:endParaRPr lang="en-US"/>
           </a:p>
@@ -1343,7 +1343,7 @@
           <a:p>
             <a:fld id="{A0FB1AA8-4F81-414A-9DAE-F97FE8EB8E18}" type="datetimeFigureOut">
               <a:rPr lang="en-US" smtClean="0"/>
-              <a:t>8/4/13</a:t>
+              <a:t>8/13/13</a:t>
             </a:fld>
             <a:endParaRPr lang="en-US"/>
           </a:p>
@@ -1765,7 +1765,7 @@
           <a:p>
             <a:fld id="{A0FB1AA8-4F81-414A-9DAE-F97FE8EB8E18}" type="datetimeFigureOut">
               <a:rPr lang="en-US" smtClean="0"/>
-              <a:t>8/4/13</a:t>
+              <a:t>8/13/13</a:t>
             </a:fld>
             <a:endParaRPr lang="en-US"/>
           </a:p>
@@ -1883,7 +1883,7 @@
           <a:p>
             <a:fld id="{A0FB1AA8-4F81-414A-9DAE-F97FE8EB8E18}" type="datetimeFigureOut">
               <a:rPr lang="en-US" smtClean="0"/>
-              <a:t>8/4/13</a:t>
+              <a:t>8/13/13</a:t>
             </a:fld>
             <a:endParaRPr lang="en-US"/>
           </a:p>
@@ -1978,7 +1978,7 @@
           <a:p>
             <a:fld id="{A0FB1AA8-4F81-414A-9DAE-F97FE8EB8E18}" type="datetimeFigureOut">
               <a:rPr lang="en-US" smtClean="0"/>
-              <a:t>8/4/13</a:t>
+              <a:t>8/13/13</a:t>
             </a:fld>
             <a:endParaRPr lang="en-US"/>
           </a:p>
@@ -2255,7 +2255,7 @@
           <a:p>
             <a:fld id="{A0FB1AA8-4F81-414A-9DAE-F97FE8EB8E18}" type="datetimeFigureOut">
               <a:rPr lang="en-US" smtClean="0"/>
-              <a:t>8/4/13</a:t>
+              <a:t>8/13/13</a:t>
             </a:fld>
             <a:endParaRPr lang="en-US"/>
           </a:p>
@@ -2508,7 +2508,7 @@
           <a:p>
             <a:fld id="{A0FB1AA8-4F81-414A-9DAE-F97FE8EB8E18}" type="datetimeFigureOut">
               <a:rPr lang="en-US" smtClean="0"/>
-              <a:t>8/4/13</a:t>
+              <a:t>8/13/13</a:t>
             </a:fld>
             <a:endParaRPr lang="en-US"/>
           </a:p>
@@ -2721,7 +2721,7 @@
           <a:p>
             <a:fld id="{A0FB1AA8-4F81-414A-9DAE-F97FE8EB8E18}" type="datetimeFigureOut">
               <a:rPr lang="en-US" smtClean="0"/>
-              <a:t>8/4/13</a:t>
+              <a:t>8/13/13</a:t>
             </a:fld>
             <a:endParaRPr lang="en-US"/>
           </a:p>

</xml_diff>